<commit_message>
Fixed tetha join definition.
</commit_message>
<xml_diff>
--- a/sql/lectures/3_relational_algebra.pptx
+++ b/sql/lectures/3_relational_algebra.pptx
@@ -340,7 +340,7 @@
             <a:fld id="{B61BEF0D-F0BB-DE4B-95CE-6DB70DBA9567}" type="datetimeFigureOut">
               <a:rPr lang="en-US" smtClean="0"/>
               <a:pPr/>
-              <a:t>9/14/2013</a:t>
+              <a:t>9/20/2013</a:t>
             </a:fld>
             <a:endParaRPr lang="en-US" dirty="0"/>
           </a:p>
@@ -633,7 +633,7 @@
             <a:fld id="{B61BEF0D-F0BB-DE4B-95CE-6DB70DBA9567}" type="datetimeFigureOut">
               <a:rPr lang="en-US" smtClean="0"/>
               <a:pPr/>
-              <a:t>9/14/2013</a:t>
+              <a:t>9/20/2013</a:t>
             </a:fld>
             <a:endParaRPr lang="en-US" dirty="0"/>
           </a:p>
@@ -899,7 +899,7 @@
             <a:fld id="{B61BEF0D-F0BB-DE4B-95CE-6DB70DBA9567}" type="datetimeFigureOut">
               <a:rPr lang="en-US" smtClean="0"/>
               <a:pPr/>
-              <a:t>9/14/2013</a:t>
+              <a:t>9/20/2013</a:t>
             </a:fld>
             <a:endParaRPr lang="en-US" dirty="0"/>
           </a:p>
@@ -1461,7 +1461,7 @@
             <a:fld id="{B61BEF0D-F0BB-DE4B-95CE-6DB70DBA9567}" type="datetimeFigureOut">
               <a:rPr lang="en-US" smtClean="0"/>
               <a:pPr/>
-              <a:t>9/14/2013</a:t>
+              <a:t>9/20/2013</a:t>
             </a:fld>
             <a:endParaRPr lang="en-US" dirty="0"/>
           </a:p>
@@ -1722,7 +1722,7 @@
             <a:fld id="{B61BEF0D-F0BB-DE4B-95CE-6DB70DBA9567}" type="datetimeFigureOut">
               <a:rPr lang="en-US" smtClean="0"/>
               <a:pPr/>
-              <a:t>9/14/2013</a:t>
+              <a:t>9/20/2013</a:t>
             </a:fld>
             <a:endParaRPr lang="en-US" dirty="0"/>
           </a:p>
@@ -2300,7 +2300,7 @@
             <a:fld id="{B61BEF0D-F0BB-DE4B-95CE-6DB70DBA9567}" type="datetimeFigureOut">
               <a:rPr lang="en-US" smtClean="0"/>
               <a:pPr/>
-              <a:t>9/14/2013</a:t>
+              <a:t>9/20/2013</a:t>
             </a:fld>
             <a:endParaRPr lang="en-US" dirty="0"/>
           </a:p>
@@ -2634,7 +2634,7 @@
             <a:fld id="{B61BEF0D-F0BB-DE4B-95CE-6DB70DBA9567}" type="datetimeFigureOut">
               <a:rPr lang="en-US" smtClean="0"/>
               <a:pPr/>
-              <a:t>9/14/2013</a:t>
+              <a:t>9/20/2013</a:t>
             </a:fld>
             <a:endParaRPr lang="en-US" dirty="0"/>
           </a:p>
@@ -2811,7 +2811,7 @@
             <a:fld id="{B61BEF0D-F0BB-DE4B-95CE-6DB70DBA9567}" type="datetimeFigureOut">
               <a:rPr lang="en-US" smtClean="0"/>
               <a:pPr/>
-              <a:t>9/14/2013</a:t>
+              <a:t>9/20/2013</a:t>
             </a:fld>
             <a:endParaRPr lang="en-US" dirty="0"/>
           </a:p>
@@ -2993,7 +2993,7 @@
             <a:fld id="{B61BEF0D-F0BB-DE4B-95CE-6DB70DBA9567}" type="datetimeFigureOut">
               <a:rPr lang="en-US" smtClean="0"/>
               <a:pPr/>
-              <a:t>9/14/2013</a:t>
+              <a:t>9/20/2013</a:t>
             </a:fld>
             <a:endParaRPr lang="en-US" dirty="0"/>
           </a:p>
@@ -3165,7 +3165,7 @@
             <a:fld id="{B61BEF0D-F0BB-DE4B-95CE-6DB70DBA9567}" type="datetimeFigureOut">
               <a:rPr lang="en-US" smtClean="0"/>
               <a:pPr/>
-              <a:t>9/14/2013</a:t>
+              <a:t>9/20/2013</a:t>
             </a:fld>
             <a:endParaRPr lang="en-US" dirty="0"/>
           </a:p>
@@ -3426,7 +3426,7 @@
             <a:fld id="{B61BEF0D-F0BB-DE4B-95CE-6DB70DBA9567}" type="datetimeFigureOut">
               <a:rPr lang="en-US" smtClean="0"/>
               <a:pPr/>
-              <a:t>9/14/2013</a:t>
+              <a:t>9/20/2013</a:t>
             </a:fld>
             <a:endParaRPr lang="en-US" dirty="0"/>
           </a:p>
@@ -3720,7 +3720,7 @@
             <a:fld id="{B61BEF0D-F0BB-DE4B-95CE-6DB70DBA9567}" type="datetimeFigureOut">
               <a:rPr lang="en-US" smtClean="0"/>
               <a:pPr/>
-              <a:t>9/14/2013</a:t>
+              <a:t>9/20/2013</a:t>
             </a:fld>
             <a:endParaRPr lang="en-US" dirty="0"/>
           </a:p>
@@ -4152,7 +4152,7 @@
             <a:fld id="{B61BEF0D-F0BB-DE4B-95CE-6DB70DBA9567}" type="datetimeFigureOut">
               <a:rPr lang="en-US" smtClean="0"/>
               <a:pPr/>
-              <a:t>9/14/2013</a:t>
+              <a:t>9/20/2013</a:t>
             </a:fld>
             <a:endParaRPr lang="en-US" dirty="0"/>
           </a:p>
@@ -4278,7 +4278,7 @@
             <a:fld id="{B61BEF0D-F0BB-DE4B-95CE-6DB70DBA9567}" type="datetimeFigureOut">
               <a:rPr lang="en-US" smtClean="0"/>
               <a:pPr/>
-              <a:t>9/14/2013</a:t>
+              <a:t>9/20/2013</a:t>
             </a:fld>
             <a:endParaRPr lang="en-US" dirty="0"/>
           </a:p>
@@ -4375,7 +4375,7 @@
             <a:fld id="{B61BEF0D-F0BB-DE4B-95CE-6DB70DBA9567}" type="datetimeFigureOut">
               <a:rPr lang="en-US" smtClean="0"/>
               <a:pPr/>
-              <a:t>9/14/2013</a:t>
+              <a:t>9/20/2013</a:t>
             </a:fld>
             <a:endParaRPr lang="en-US" dirty="0"/>
           </a:p>
@@ -4660,7 +4660,7 @@
             <a:fld id="{B61BEF0D-F0BB-DE4B-95CE-6DB70DBA9567}" type="datetimeFigureOut">
               <a:rPr lang="en-US" smtClean="0"/>
               <a:pPr/>
-              <a:t>9/14/2013</a:t>
+              <a:t>9/20/2013</a:t>
             </a:fld>
             <a:endParaRPr lang="en-US" dirty="0"/>
           </a:p>
@@ -4953,7 +4953,7 @@
             <a:fld id="{B61BEF0D-F0BB-DE4B-95CE-6DB70DBA9567}" type="datetimeFigureOut">
               <a:rPr lang="en-US" smtClean="0"/>
               <a:pPr/>
-              <a:t>9/14/2013</a:t>
+              <a:t>9/20/2013</a:t>
             </a:fld>
             <a:endParaRPr lang="en-US" dirty="0"/>
           </a:p>
@@ -5186,7 +5186,7 @@
             <a:fld id="{B61BEF0D-F0BB-DE4B-95CE-6DB70DBA9567}" type="datetimeFigureOut">
               <a:rPr lang="en-US" smtClean="0"/>
               <a:pPr/>
-              <a:t>9/14/2013</a:t>
+              <a:t>9/20/2013</a:t>
             </a:fld>
             <a:endParaRPr lang="en-US" dirty="0"/>
           </a:p>
@@ -10590,8 +10590,8 @@
           </a:p>
         </p:txBody>
       </p:sp>
-      <mc:AlternateContent xmlns:mc="http://schemas.openxmlformats.org/markup-compatibility/2006" xmlns:a14="http://schemas.microsoft.com/office/drawing/2010/main">
-        <mc:Choice Requires="a14">
+      <mc:AlternateContent xmlns:mc="http://schemas.openxmlformats.org/markup-compatibility/2006">
+        <mc:Choice xmlns:a14="http://schemas.microsoft.com/office/drawing/2010/main" Requires="a14">
           <p:sp>
             <p:nvSpPr>
               <p:cNvPr id="8" name="Объект 7"/>
@@ -10614,11 +10614,27 @@
               <a:p>
                 <a:r>
                   <a:rPr lang="ru-RU" dirty="0" smtClean="0"/>
-                  <a:t>Может быть переписан как </a:t>
+                  <a:t>Может быть переписан </a:t>
+                </a:r>
+                <a:r>
+                  <a:rPr lang="ru-RU" dirty="0" smtClean="0"/>
+                  <a:t>как</a:t>
+                </a:r>
+                <a:r>
+                  <a:rPr lang="en-US" dirty="0"/>
+                  <a:t> </a:t>
                 </a:r>
                 <a:r>
                   <a:rPr lang="en-US" dirty="0" smtClean="0"/>
-                  <a:t>natural join</a:t>
+                  <a:t>cross</a:t>
+                </a:r>
+                <a:r>
+                  <a:rPr lang="en-US" dirty="0" smtClean="0"/>
+                  <a:t> </a:t>
+                </a:r>
+                <a:r>
+                  <a:rPr lang="en-US" dirty="0" smtClean="0"/>
+                  <a:t>join</a:t>
                 </a:r>
                 <a:r>
                   <a:rPr lang="ru-RU" dirty="0" smtClean="0"/>
@@ -10750,7 +10766,7 @@
             </p:txBody>
           </p:sp>
         </mc:Choice>
-        <mc:Fallback xmlns="">
+        <mc:Fallback>
           <p:sp>
             <p:nvSpPr>
               <p:cNvPr id="8" name="Объект 7"/>
@@ -10901,8 +10917,12 @@
           <a:p>
             <a:pPr lvl="1"/>
             <a:r>
-              <a:rPr lang="en-US" dirty="0" err="1" smtClean="0"/>
-              <a:t>sroject</a:t>
+              <a:rPr lang="en-US" dirty="0"/>
+              <a:t>p</a:t>
+            </a:r>
+            <a:r>
+              <a:rPr lang="en-US" dirty="0" smtClean="0"/>
+              <a:t>roject</a:t>
             </a:r>
             <a:endParaRPr lang="en-US" dirty="0" smtClean="0"/>
           </a:p>

</xml_diff>